<commit_message>
Added week three content.
</commit_message>
<xml_diff>
--- a/FEWorkshop-Week2.pptx
+++ b/FEWorkshop-Week2.pptx
@@ -250,7 +250,7 @@
           <a:p>
             <a:fld id="{A8E03A04-0626-44D4-B6D6-43B9D98023FD}" type="datetimeFigureOut">
               <a:rPr lang="en-US" smtClean="0"/>
-              <a:t>10/10/16</a:t>
+              <a:t>10/11/16</a:t>
             </a:fld>
             <a:endParaRPr lang="en-US"/>
           </a:p>
@@ -7214,14 +7214,14 @@
           </a:ln>
           <a:extLst>
             <a:ext uri="{909E8E84-426E-40dd-AFC4-6F175D3DCCD1}">
-              <a14:hiddenFill xmlns="" xmlns:a14="http://schemas.microsoft.com/office/drawing/2010/main">
+              <a14:hiddenFill xmlns:a14="http://schemas.microsoft.com/office/drawing/2010/main" xmlns="">
                 <a:solidFill>
                   <a:srgbClr val="FFFFFF"/>
                 </a:solidFill>
               </a14:hiddenFill>
             </a:ext>
             <a:ext uri="{91240B29-F687-4f45-9708-019B960494DF}">
-              <a14:hiddenLine xmlns="" xmlns:a14="http://schemas.microsoft.com/office/drawing/2010/main" w="12700">
+              <a14:hiddenLine xmlns:a14="http://schemas.microsoft.com/office/drawing/2010/main" xmlns="" w="12700">
                 <a:solidFill>
                   <a:srgbClr val="000000"/>
                 </a:solidFill>
@@ -7784,14 +7784,14 @@
           </a:ln>
           <a:extLst>
             <a:ext uri="{909E8E84-426E-40dd-AFC4-6F175D3DCCD1}">
-              <a14:hiddenFill xmlns="" xmlns:a14="http://schemas.microsoft.com/office/drawing/2010/main">
+              <a14:hiddenFill xmlns:a14="http://schemas.microsoft.com/office/drawing/2010/main" xmlns="">
                 <a:solidFill>
                   <a:srgbClr val="FFFFFF"/>
                 </a:solidFill>
               </a14:hiddenFill>
             </a:ext>
             <a:ext uri="{91240B29-F687-4f45-9708-019B960494DF}">
-              <a14:hiddenLine xmlns="" xmlns:a14="http://schemas.microsoft.com/office/drawing/2010/main" w="12700">
+              <a14:hiddenLine xmlns:a14="http://schemas.microsoft.com/office/drawing/2010/main" xmlns="" w="12700">
                 <a:solidFill>
                   <a:srgbClr val="000000"/>
                 </a:solidFill>
@@ -7891,14 +7891,14 @@
           </a:ln>
           <a:extLst>
             <a:ext uri="{909E8E84-426E-40dd-AFC4-6F175D3DCCD1}">
-              <a14:hiddenFill xmlns="" xmlns:a14="http://schemas.microsoft.com/office/drawing/2010/main">
+              <a14:hiddenFill xmlns:a14="http://schemas.microsoft.com/office/drawing/2010/main" xmlns="">
                 <a:solidFill>
                   <a:srgbClr val="FFFFFF"/>
                 </a:solidFill>
               </a14:hiddenFill>
             </a:ext>
             <a:ext uri="{91240B29-F687-4f45-9708-019B960494DF}">
-              <a14:hiddenLine xmlns="" xmlns:a14="http://schemas.microsoft.com/office/drawing/2010/main" w="12700">
+              <a14:hiddenLine xmlns:a14="http://schemas.microsoft.com/office/drawing/2010/main" xmlns="" w="12700">
                 <a:solidFill>
                   <a:srgbClr val="000000"/>
                 </a:solidFill>
@@ -10325,14 +10325,6 @@
               </a:rPr>
               <a:t>;</a:t>
             </a:r>
-            <a:endParaRPr lang="en-US" sz="2800" dirty="0" smtClean="0">
-              <a:solidFill>
-                <a:schemeClr val="bg1"/>
-              </a:solidFill>
-              <a:latin typeface="PT Mono" charset="0"/>
-              <a:ea typeface="PT Mono" charset="0"/>
-              <a:cs typeface="PT Mono" charset="0"/>
-            </a:endParaRPr>
           </a:p>
           <a:p>
             <a:pPr marL="457200" indent="-457200">
@@ -10348,18 +10340,7 @@
                 <a:ea typeface="PT Mono" charset="0"/>
                 <a:cs typeface="PT Mono" charset="0"/>
               </a:rPr>
-              <a:t>display</a:t>
-            </a:r>
-            <a:r>
-              <a:rPr lang="en-US" sz="2800" dirty="0" smtClean="0">
-                <a:solidFill>
-                  <a:schemeClr val="bg1"/>
-                </a:solidFill>
-                <a:latin typeface="PT Mono" charset="0"/>
-                <a:ea typeface="PT Mono" charset="0"/>
-                <a:cs typeface="PT Mono" charset="0"/>
-              </a:rPr>
-              <a:t>: block;</a:t>
+              <a:t>display: block;</a:t>
             </a:r>
             <a:endParaRPr lang="en-US" sz="2800" dirty="0">
               <a:solidFill>
@@ -10384,18 +10365,7 @@
                 <a:ea typeface="PT Mono" charset="0"/>
                 <a:cs typeface="PT Mono" charset="0"/>
               </a:rPr>
-              <a:t>padding: 30px 20px 30px 20px</a:t>
-            </a:r>
-            <a:r>
-              <a:rPr lang="en-US" sz="2800" dirty="0" smtClean="0">
-                <a:solidFill>
-                  <a:schemeClr val="bg1"/>
-                </a:solidFill>
-                <a:latin typeface="PT Mono" charset="0"/>
-                <a:ea typeface="PT Mono" charset="0"/>
-                <a:cs typeface="PT Mono" charset="0"/>
-              </a:rPr>
-              <a:t>; (clockwise)</a:t>
+              <a:t>padding: 30px 20px 30px 20px; (clockwise)</a:t>
             </a:r>
             <a:endParaRPr lang="en-US" sz="2800" dirty="0">
               <a:solidFill>
@@ -12538,14 +12508,6 @@
               </a:rPr>
               <a:t>Browsers have their own default stylesheets</a:t>
             </a:r>
-            <a:endParaRPr lang="en-US" sz="2800" dirty="0" smtClean="0">
-              <a:solidFill>
-                <a:schemeClr val="bg1"/>
-              </a:solidFill>
-              <a:latin typeface="DIN Alternate" charset="0"/>
-              <a:ea typeface="DIN Alternate" charset="0"/>
-              <a:cs typeface="DIN Alternate" charset="0"/>
-            </a:endParaRPr>
           </a:p>
         </p:txBody>
       </p:sp>
@@ -12710,7 +12672,7 @@
           </a:p>
           <a:p>
             <a:r>
-              <a:rPr lang="nl-NL" sz="2800" dirty="0">
+              <a:rPr lang="nl-NL" sz="2800" dirty="0" smtClean="0">
                 <a:solidFill>
                   <a:schemeClr val="bg1"/>
                 </a:solidFill>
@@ -12718,12 +12680,10 @@
                 <a:ea typeface="PT Mono" charset="0"/>
                 <a:cs typeface="PT Mono" charset="0"/>
               </a:rPr>
-              <a:t>p {</a:t>
-            </a:r>
-          </a:p>
-          <a:p>
-            <a:r>
-              <a:rPr lang="nl-NL" sz="2800" dirty="0">
+              <a:t>h1</a:t>
+            </a:r>
+            <a:r>
+              <a:rPr lang="nl-NL" sz="2800" dirty="0" smtClean="0">
                 <a:solidFill>
                   <a:schemeClr val="bg1"/>
                 </a:solidFill>
@@ -12731,67 +12691,8 @@
                 <a:ea typeface="PT Mono" charset="0"/>
                 <a:cs typeface="PT Mono" charset="0"/>
               </a:rPr>
-              <a:t>  </a:t>
-            </a:r>
-            <a:r>
-              <a:rPr lang="nl-NL" sz="2800" dirty="0" err="1">
-                <a:solidFill>
-                  <a:schemeClr val="bg1"/>
-                </a:solidFill>
-                <a:latin typeface="PT Mono" charset="0"/>
-                <a:ea typeface="PT Mono" charset="0"/>
-                <a:cs typeface="PT Mono" charset="0"/>
-              </a:rPr>
-              <a:t>color</a:t>
-            </a:r>
-            <a:r>
-              <a:rPr lang="nl-NL" sz="2800" dirty="0">
-                <a:solidFill>
-                  <a:schemeClr val="bg1"/>
-                </a:solidFill>
-                <a:latin typeface="PT Mono" charset="0"/>
-                <a:ea typeface="PT Mono" charset="0"/>
-                <a:cs typeface="PT Mono" charset="0"/>
-              </a:rPr>
-              <a:t>: </a:t>
-            </a:r>
-            <a:r>
-              <a:rPr lang="nl-NL" sz="2800" dirty="0">
-                <a:solidFill>
-                  <a:srgbClr val="FF0000"/>
-                </a:solidFill>
-                <a:latin typeface="PT Mono" charset="0"/>
-                <a:ea typeface="PT Mono" charset="0"/>
-                <a:cs typeface="PT Mono" charset="0"/>
-              </a:rPr>
-              <a:t>red</a:t>
-            </a:r>
-            <a:r>
-              <a:rPr lang="nl-NL" sz="2800" dirty="0">
-                <a:solidFill>
-                  <a:schemeClr val="bg1"/>
-                </a:solidFill>
-                <a:latin typeface="PT Mono" charset="0"/>
-                <a:ea typeface="PT Mono" charset="0"/>
-                <a:cs typeface="PT Mono" charset="0"/>
-              </a:rPr>
-              <a:t>;</a:t>
-            </a:r>
-          </a:p>
-          <a:p>
-            <a:r>
-              <a:rPr lang="nl-NL" sz="2800" dirty="0">
-                <a:solidFill>
-                  <a:schemeClr val="bg1"/>
-                </a:solidFill>
-                <a:latin typeface="PT Mono" charset="0"/>
-                <a:ea typeface="PT Mono" charset="0"/>
-                <a:cs typeface="PT Mono" charset="0"/>
-              </a:rPr>
-              <a:t>}</a:t>
-            </a:r>
-          </a:p>
-          <a:p>
+              <a:t> {</a:t>
+            </a:r>
             <a:endParaRPr lang="nl-NL" sz="2800" dirty="0">
               <a:solidFill>
                 <a:schemeClr val="bg1"/>
@@ -12811,7 +12712,120 @@
                 <a:ea typeface="PT Mono" charset="0"/>
                 <a:cs typeface="PT Mono" charset="0"/>
               </a:rPr>
-              <a:t>p {</a:t>
+              <a:t>  </a:t>
+            </a:r>
+            <a:r>
+              <a:rPr lang="nl-NL" sz="2800" dirty="0" err="1">
+                <a:solidFill>
+                  <a:schemeClr val="bg1"/>
+                </a:solidFill>
+                <a:latin typeface="PT Mono" charset="0"/>
+                <a:ea typeface="PT Mono" charset="0"/>
+                <a:cs typeface="PT Mono" charset="0"/>
+              </a:rPr>
+              <a:t>color</a:t>
+            </a:r>
+            <a:r>
+              <a:rPr lang="nl-NL" sz="2800" dirty="0">
+                <a:solidFill>
+                  <a:schemeClr val="bg1"/>
+                </a:solidFill>
+                <a:latin typeface="PT Mono" charset="0"/>
+                <a:ea typeface="PT Mono" charset="0"/>
+                <a:cs typeface="PT Mono" charset="0"/>
+              </a:rPr>
+              <a:t>: </a:t>
+            </a:r>
+            <a:r>
+              <a:rPr lang="nl-NL" sz="2800" dirty="0">
+                <a:solidFill>
+                  <a:srgbClr val="FF0000"/>
+                </a:solidFill>
+                <a:latin typeface="PT Mono" charset="0"/>
+                <a:ea typeface="PT Mono" charset="0"/>
+                <a:cs typeface="PT Mono" charset="0"/>
+              </a:rPr>
+              <a:t>red</a:t>
+            </a:r>
+            <a:r>
+              <a:rPr lang="nl-NL" sz="2800" dirty="0">
+                <a:solidFill>
+                  <a:schemeClr val="bg1"/>
+                </a:solidFill>
+                <a:latin typeface="PT Mono" charset="0"/>
+                <a:ea typeface="PT Mono" charset="0"/>
+                <a:cs typeface="PT Mono" charset="0"/>
+              </a:rPr>
+              <a:t>;</a:t>
+            </a:r>
+          </a:p>
+          <a:p>
+            <a:r>
+              <a:rPr lang="nl-NL" sz="2800" dirty="0">
+                <a:solidFill>
+                  <a:schemeClr val="bg1"/>
+                </a:solidFill>
+                <a:latin typeface="PT Mono" charset="0"/>
+                <a:ea typeface="PT Mono" charset="0"/>
+                <a:cs typeface="PT Mono" charset="0"/>
+              </a:rPr>
+              <a:t>}</a:t>
+            </a:r>
+          </a:p>
+          <a:p>
+            <a:endParaRPr lang="nl-NL" sz="2800" dirty="0">
+              <a:solidFill>
+                <a:schemeClr val="bg1"/>
+              </a:solidFill>
+              <a:latin typeface="PT Mono" charset="0"/>
+              <a:ea typeface="PT Mono" charset="0"/>
+              <a:cs typeface="PT Mono" charset="0"/>
+            </a:endParaRPr>
+          </a:p>
+          <a:p>
+            <a:r>
+              <a:rPr lang="nl-NL" sz="2800" dirty="0" err="1" smtClean="0">
+                <a:solidFill>
+                  <a:schemeClr val="bg1"/>
+                </a:solidFill>
+                <a:latin typeface="PT Mono" charset="0"/>
+                <a:ea typeface="PT Mono" charset="0"/>
+                <a:cs typeface="PT Mono" charset="0"/>
+              </a:rPr>
+              <a:t>Aside</a:t>
+            </a:r>
+            <a:r>
+              <a:rPr lang="nl-NL" sz="2800" dirty="0" smtClean="0">
+                <a:solidFill>
+                  <a:schemeClr val="bg1"/>
+                </a:solidFill>
+                <a:latin typeface="PT Mono" charset="0"/>
+                <a:ea typeface="PT Mono" charset="0"/>
+                <a:cs typeface="PT Mono" charset="0"/>
+              </a:rPr>
+              <a:t> h1</a:t>
+            </a:r>
+            <a:r>
+              <a:rPr lang="nl-NL" sz="2800" dirty="0" smtClean="0">
+                <a:solidFill>
+                  <a:schemeClr val="bg1"/>
+                </a:solidFill>
+                <a:latin typeface="PT Mono" charset="0"/>
+                <a:ea typeface="PT Mono" charset="0"/>
+                <a:cs typeface="PT Mono" charset="0"/>
+              </a:rPr>
+              <a:t> </a:t>
+            </a:r>
+            <a:r>
+              <a:rPr lang="nl-NL" sz="2800" dirty="0">
+                <a:solidFill>
+                  <a:schemeClr val="bg1"/>
+                </a:solidFill>
+                <a:latin typeface="PT Mono" charset="0"/>
+                <a:ea typeface="PT Mono" charset="0"/>
+                <a:cs typeface="PT Mono" charset="0"/>
+              </a:rPr>
+              <a:t>{</a:t>
             </a:r>
           </a:p>
           <a:p>
@@ -13649,8 +13663,27 @@
                 <a:ea typeface="DIN Alternate" charset="0"/>
                 <a:cs typeface="DIN Alternate" charset="0"/>
               </a:rPr>
-              <a:t>Class - .location</a:t>
-            </a:r>
+              <a:t>Class - .</a:t>
+            </a:r>
+            <a:r>
+              <a:rPr lang="en-US" sz="2800" dirty="0" smtClean="0">
+                <a:solidFill>
+                  <a:schemeClr val="bg1"/>
+                </a:solidFill>
+                <a:latin typeface="DIN Alternate" charset="0"/>
+                <a:ea typeface="DIN Alternate" charset="0"/>
+                <a:cs typeface="DIN Alternate" charset="0"/>
+              </a:rPr>
+              <a:t>location &lt;p class=“location”&gt;</a:t>
+            </a:r>
+            <a:endParaRPr lang="en-US" sz="2800" dirty="0">
+              <a:solidFill>
+                <a:schemeClr val="bg1"/>
+              </a:solidFill>
+              <a:latin typeface="DIN Alternate" charset="0"/>
+              <a:ea typeface="DIN Alternate" charset="0"/>
+              <a:cs typeface="DIN Alternate" charset="0"/>
+            </a:endParaRPr>
           </a:p>
           <a:p>
             <a:pPr marL="457200" indent="-457200">
@@ -13658,7 +13691,7 @@
               <a:buChar char="•"/>
             </a:pPr>
             <a:r>
-              <a:rPr lang="en-US" sz="2800" dirty="0">
+              <a:rPr lang="en-US" sz="2800" dirty="0" smtClean="0">
                 <a:solidFill>
                   <a:schemeClr val="bg1"/>
                 </a:solidFill>
@@ -13666,8 +13699,38 @@
                 <a:ea typeface="DIN Alternate" charset="0"/>
                 <a:cs typeface="DIN Alternate" charset="0"/>
               </a:rPr>
-              <a:t>ID - #photos</a:t>
-            </a:r>
+              <a:t>ID </a:t>
+            </a:r>
+            <a:r>
+              <a:rPr lang="en-US" sz="2800" dirty="0">
+                <a:solidFill>
+                  <a:schemeClr val="bg1"/>
+                </a:solidFill>
+                <a:latin typeface="DIN Alternate" charset="0"/>
+                <a:ea typeface="DIN Alternate" charset="0"/>
+                <a:cs typeface="DIN Alternate" charset="0"/>
+              </a:rPr>
+              <a:t>- #</a:t>
+            </a:r>
+            <a:r>
+              <a:rPr lang="en-US" sz="2800" dirty="0" smtClean="0">
+                <a:solidFill>
+                  <a:schemeClr val="bg1"/>
+                </a:solidFill>
+                <a:latin typeface="DIN Alternate" charset="0"/>
+                <a:ea typeface="DIN Alternate" charset="0"/>
+                <a:cs typeface="DIN Alternate" charset="0"/>
+              </a:rPr>
+              <a:t>photos &lt;p id=“my-location”&gt;</a:t>
+            </a:r>
+            <a:endParaRPr lang="en-US" sz="2800" dirty="0">
+              <a:solidFill>
+                <a:schemeClr val="bg1"/>
+              </a:solidFill>
+              <a:latin typeface="DIN Alternate" charset="0"/>
+              <a:ea typeface="DIN Alternate" charset="0"/>
+              <a:cs typeface="DIN Alternate" charset="0"/>
+            </a:endParaRPr>
           </a:p>
           <a:p>
             <a:pPr marL="457200" indent="-457200">
@@ -13820,7 +13883,7 @@
         <p:spPr>
           <a:xfrm>
             <a:off x="685800" y="1589291"/>
-            <a:ext cx="10658959" cy="2677656"/>
+            <a:ext cx="10658959" cy="3108543"/>
           </a:xfrm>
           <a:prstGeom prst="rect">
             <a:avLst/>
@@ -13975,7 +14038,7 @@
               <a:buChar char="•"/>
             </a:pPr>
             <a:r>
-              <a:rPr lang="en-US" sz="2800" dirty="0" err="1" smtClean="0">
+              <a:rPr lang="en-US" sz="2800" dirty="0" smtClean="0">
                 <a:solidFill>
                   <a:schemeClr val="bg1"/>
                 </a:solidFill>
@@ -13983,7 +14046,7 @@
                 <a:ea typeface="PT Mono" charset="0"/>
                 <a:cs typeface="PT Mono" charset="0"/>
               </a:rPr>
-              <a:t>main#photos</a:t>
+              <a:t>main #photos </a:t>
             </a:r>
             <a:r>
               <a:rPr lang="en-US" sz="2800" dirty="0">
@@ -13994,7 +14057,7 @@
                 <a:ea typeface="PT Mono" charset="0"/>
                 <a:cs typeface="PT Mono" charset="0"/>
               </a:rPr>
-              <a:t> { </a:t>
+              <a:t>{ </a:t>
             </a:r>
             <a:r>
               <a:rPr lang="is-IS" sz="2800" dirty="0">
@@ -14138,8 +14201,44 @@
                 <a:ea typeface="PT Mono" charset="0"/>
                 <a:cs typeface="PT Mono" charset="0"/>
               </a:rPr>
-              <a:t> }</a:t>
-            </a:r>
+              <a:t> </a:t>
+            </a:r>
+            <a:r>
+              <a:rPr lang="en-US" sz="2800" dirty="0" smtClean="0">
+                <a:solidFill>
+                  <a:schemeClr val="bg1"/>
+                </a:solidFill>
+                <a:latin typeface="PT Mono" charset="0"/>
+                <a:ea typeface="PT Mono" charset="0"/>
+                <a:cs typeface="PT Mono" charset="0"/>
+              </a:rPr>
+              <a:t>}</a:t>
+            </a:r>
+          </a:p>
+          <a:p>
+            <a:pPr marL="457200" indent="-457200">
+              <a:buFont typeface="Arial" charset="0"/>
+              <a:buChar char="•"/>
+            </a:pPr>
+            <a:r>
+              <a:rPr lang="en-US" sz="2800" dirty="0" smtClean="0">
+                <a:solidFill>
+                  <a:schemeClr val="bg1"/>
+                </a:solidFill>
+                <a:latin typeface="PT Mono" charset="0"/>
+                <a:ea typeface="PT Mono" charset="0"/>
+                <a:cs typeface="PT Mono" charset="0"/>
+              </a:rPr>
+              <a:t>[class=“^col-”]</a:t>
+            </a:r>
+            <a:endParaRPr lang="en-US" sz="2800" dirty="0">
+              <a:solidFill>
+                <a:schemeClr val="bg1"/>
+              </a:solidFill>
+              <a:latin typeface="PT Mono" charset="0"/>
+              <a:ea typeface="PT Mono" charset="0"/>
+              <a:cs typeface="PT Mono" charset="0"/>
+            </a:endParaRPr>
           </a:p>
         </p:txBody>
       </p:sp>

</xml_diff>